<commit_message>
Cập nhập mã màu
</commit_message>
<xml_diff>
--- a/Ý tưởng thiết kế giao diện web(v1).pptx
+++ b/Ý tưởng thiết kế giao diện web(v1).pptx
@@ -352,7 +352,7 @@
             <a:fld id="{1D8BD707-D9CF-40AE-B4C6-C98DA3205C09}" type="datetimeFigureOut">
               <a:rPr lang="en-US" smtClean="0"/>
               <a:pPr/>
-              <a:t>3/21/22</a:t>
+              <a:t>3/24/22</a:t>
             </a:fld>
             <a:endParaRPr lang="en-US"/>
           </a:p>
@@ -517,7 +517,7 @@
             <a:fld id="{1D8BD707-D9CF-40AE-B4C6-C98DA3205C09}" type="datetimeFigureOut">
               <a:rPr lang="en-US" smtClean="0"/>
               <a:pPr/>
-              <a:t>3/21/22</a:t>
+              <a:t>3/24/22</a:t>
             </a:fld>
             <a:endParaRPr lang="en-US"/>
           </a:p>
@@ -692,7 +692,7 @@
             <a:fld id="{1D8BD707-D9CF-40AE-B4C6-C98DA3205C09}" type="datetimeFigureOut">
               <a:rPr lang="en-US" smtClean="0"/>
               <a:pPr/>
-              <a:t>3/21/22</a:t>
+              <a:t>3/24/22</a:t>
             </a:fld>
             <a:endParaRPr lang="en-US"/>
           </a:p>
@@ -857,7 +857,7 @@
             <a:fld id="{1D8BD707-D9CF-40AE-B4C6-C98DA3205C09}" type="datetimeFigureOut">
               <a:rPr lang="en-US" smtClean="0"/>
               <a:pPr/>
-              <a:t>3/21/22</a:t>
+              <a:t>3/24/22</a:t>
             </a:fld>
             <a:endParaRPr lang="en-US"/>
           </a:p>
@@ -1099,7 +1099,7 @@
             <a:fld id="{1D8BD707-D9CF-40AE-B4C6-C98DA3205C09}" type="datetimeFigureOut">
               <a:rPr lang="en-US" smtClean="0"/>
               <a:pPr/>
-              <a:t>3/21/22</a:t>
+              <a:t>3/24/22</a:t>
             </a:fld>
             <a:endParaRPr lang="en-US"/>
           </a:p>
@@ -1381,7 +1381,7 @@
             <a:fld id="{1D8BD707-D9CF-40AE-B4C6-C98DA3205C09}" type="datetimeFigureOut">
               <a:rPr lang="en-US" smtClean="0"/>
               <a:pPr/>
-              <a:t>3/21/22</a:t>
+              <a:t>3/24/22</a:t>
             </a:fld>
             <a:endParaRPr lang="en-US"/>
           </a:p>
@@ -1797,7 +1797,7 @@
             <a:fld id="{1D8BD707-D9CF-40AE-B4C6-C98DA3205C09}" type="datetimeFigureOut">
               <a:rPr lang="en-US" smtClean="0"/>
               <a:pPr/>
-              <a:t>3/21/22</a:t>
+              <a:t>3/24/22</a:t>
             </a:fld>
             <a:endParaRPr lang="en-US"/>
           </a:p>
@@ -1911,7 +1911,7 @@
             <a:fld id="{1D8BD707-D9CF-40AE-B4C6-C98DA3205C09}" type="datetimeFigureOut">
               <a:rPr lang="en-US" smtClean="0"/>
               <a:pPr/>
-              <a:t>3/21/22</a:t>
+              <a:t>3/24/22</a:t>
             </a:fld>
             <a:endParaRPr lang="en-US"/>
           </a:p>
@@ -2003,7 +2003,7 @@
             <a:fld id="{1D8BD707-D9CF-40AE-B4C6-C98DA3205C09}" type="datetimeFigureOut">
               <a:rPr lang="en-US" smtClean="0"/>
               <a:pPr/>
-              <a:t>3/21/22</a:t>
+              <a:t>3/24/22</a:t>
             </a:fld>
             <a:endParaRPr lang="en-US"/>
           </a:p>
@@ -2275,7 +2275,7 @@
             <a:fld id="{1D8BD707-D9CF-40AE-B4C6-C98DA3205C09}" type="datetimeFigureOut">
               <a:rPr lang="en-US" smtClean="0"/>
               <a:pPr/>
-              <a:t>3/21/22</a:t>
+              <a:t>3/24/22</a:t>
             </a:fld>
             <a:endParaRPr lang="en-US"/>
           </a:p>
@@ -2524,7 +2524,7 @@
             <a:fld id="{1D8BD707-D9CF-40AE-B4C6-C98DA3205C09}" type="datetimeFigureOut">
               <a:rPr lang="en-US" smtClean="0"/>
               <a:pPr/>
-              <a:t>3/21/22</a:t>
+              <a:t>3/24/22</a:t>
             </a:fld>
             <a:endParaRPr lang="en-US"/>
           </a:p>
@@ -2732,7 +2732,7 @@
             <a:fld id="{1D8BD707-D9CF-40AE-B4C6-C98DA3205C09}" type="datetimeFigureOut">
               <a:rPr lang="en-US" smtClean="0"/>
               <a:pPr/>
-              <a:t>3/21/22</a:t>
+              <a:t>3/24/22</a:t>
             </a:fld>
             <a:endParaRPr lang="en-US"/>
           </a:p>
@@ -4188,6 +4188,41 @@
           </a:p>
         </p:txBody>
       </p:sp>
+      <p:sp>
+        <p:nvSpPr>
+          <p:cNvPr id="37" name="TextBox 36">
+            <a:extLst>
+              <a:ext uri="{FF2B5EF4-FFF2-40B4-BE49-F238E27FC236}">
+                <a16:creationId xmlns:a16="http://schemas.microsoft.com/office/drawing/2014/main" id="{8A22A65E-94B8-CE47-AF19-0DA5E89995CC}"/>
+              </a:ext>
+            </a:extLst>
+          </p:cNvPr>
+          <p:cNvSpPr txBox="1"/>
+          <p:nvPr/>
+        </p:nvSpPr>
+        <p:spPr>
+          <a:xfrm>
+            <a:off x="1920945" y="8572500"/>
+            <a:ext cx="7070655" cy="369332"/>
+          </a:xfrm>
+          <a:prstGeom prst="rect">
+            <a:avLst/>
+          </a:prstGeom>
+          <a:noFill/>
+        </p:spPr>
+        <p:txBody>
+          <a:bodyPr wrap="square" rtlCol="0">
+            <a:spAutoFit/>
+          </a:bodyPr>
+          <a:lstStyle/>
+          <a:p>
+            <a:r>
+              <a:rPr lang="vi-VN" dirty="0"/>
+              <a:t>Mã màu : #8FA2F6</a:t>
+            </a:r>
+          </a:p>
+        </p:txBody>
+      </p:sp>
     </p:spTree>
   </p:cSld>
   <p:clrMapOvr>
@@ -8194,6 +8229,13 @@
               <a:srgbClr val="8FA2F6"/>
             </a:solidFill>
           </p:spPr>
+          <p:txBody>
+            <a:bodyPr/>
+            <a:lstStyle/>
+            <a:p>
+              <a:endParaRPr lang="vi-VN" dirty="0"/>
+            </a:p>
+          </p:txBody>
         </p:sp>
       </p:grpSp>
       <p:grpSp>

</xml_diff>

<commit_message>
Update Ý tưởng thiết kế giao diện web(v1).pptx
</commit_message>
<xml_diff>
--- a/Ý tưởng thiết kế giao diện web(v1).pptx
+++ b/Ý tưởng thiết kế giao diện web(v1).pptx
@@ -9238,13 +9238,157 @@
               </a:lnSpc>
             </a:pPr>
             <a:r>
-              <a:rPr lang="en-US" sz="3099">
+              <a:rPr lang="en-US" sz="3099" dirty="0">
                 <a:solidFill>
                   <a:srgbClr val="000000"/>
                 </a:solidFill>
                 <a:latin typeface="DejaVu Serif"/>
               </a:rPr>
-              <a:t>CCCD: (nếu được sẽ thêm 2 ô xác nhận 2 mặt) </a:t>
+              <a:t>CCCD/CCND: (</a:t>
+            </a:r>
+            <a:r>
+              <a:rPr lang="en-US" sz="3099" dirty="0" err="1">
+                <a:solidFill>
+                  <a:srgbClr val="000000"/>
+                </a:solidFill>
+                <a:latin typeface="DejaVu Serif"/>
+              </a:rPr>
+              <a:t>nếu</a:t>
+            </a:r>
+            <a:r>
+              <a:rPr lang="en-US" sz="3099" dirty="0">
+                <a:solidFill>
+                  <a:srgbClr val="000000"/>
+                </a:solidFill>
+                <a:latin typeface="DejaVu Serif"/>
+              </a:rPr>
+              <a:t> </a:t>
+            </a:r>
+            <a:r>
+              <a:rPr lang="en-US" sz="3099" dirty="0" err="1">
+                <a:solidFill>
+                  <a:srgbClr val="000000"/>
+                </a:solidFill>
+                <a:latin typeface="DejaVu Serif"/>
+              </a:rPr>
+              <a:t>được</a:t>
+            </a:r>
+            <a:r>
+              <a:rPr lang="en-US" sz="3099" dirty="0">
+                <a:solidFill>
+                  <a:srgbClr val="000000"/>
+                </a:solidFill>
+                <a:latin typeface="DejaVu Serif"/>
+              </a:rPr>
+              <a:t> </a:t>
+            </a:r>
+            <a:r>
+              <a:rPr lang="en-US" sz="3099" dirty="0" err="1">
+                <a:solidFill>
+                  <a:srgbClr val="000000"/>
+                </a:solidFill>
+                <a:latin typeface="DejaVu Serif"/>
+              </a:rPr>
+              <a:t>sẽ</a:t>
+            </a:r>
+            <a:r>
+              <a:rPr lang="en-US" sz="3099" dirty="0">
+                <a:solidFill>
+                  <a:srgbClr val="000000"/>
+                </a:solidFill>
+                <a:latin typeface="DejaVu Serif"/>
+              </a:rPr>
+              <a:t> </a:t>
+            </a:r>
+            <a:r>
+              <a:rPr lang="en-US" sz="3099" dirty="0" err="1">
+                <a:solidFill>
+                  <a:srgbClr val="000000"/>
+                </a:solidFill>
+                <a:latin typeface="DejaVu Serif"/>
+              </a:rPr>
+              <a:t>thêm</a:t>
+            </a:r>
+            <a:r>
+              <a:rPr lang="en-US" sz="3099" dirty="0">
+                <a:solidFill>
+                  <a:srgbClr val="000000"/>
+                </a:solidFill>
+                <a:latin typeface="DejaVu Serif"/>
+              </a:rPr>
+              <a:t> 2 </a:t>
+            </a:r>
+            <a:r>
+              <a:rPr lang="en-US" sz="3099" dirty="0" err="1">
+                <a:solidFill>
+                  <a:srgbClr val="000000"/>
+                </a:solidFill>
+                <a:latin typeface="DejaVu Serif"/>
+              </a:rPr>
+              <a:t>ô</a:t>
+            </a:r>
+            <a:r>
+              <a:rPr lang="en-US" sz="3099" dirty="0">
+                <a:solidFill>
+                  <a:srgbClr val="000000"/>
+                </a:solidFill>
+                <a:latin typeface="DejaVu Serif"/>
+              </a:rPr>
+              <a:t> </a:t>
+            </a:r>
+            <a:r>
+              <a:rPr lang="en-US" sz="3099" dirty="0" err="1">
+                <a:solidFill>
+                  <a:srgbClr val="000000"/>
+                </a:solidFill>
+                <a:latin typeface="DejaVu Serif"/>
+              </a:rPr>
+              <a:t>xác</a:t>
+            </a:r>
+            <a:r>
+              <a:rPr lang="en-US" sz="3099" dirty="0">
+                <a:solidFill>
+                  <a:srgbClr val="000000"/>
+                </a:solidFill>
+                <a:latin typeface="DejaVu Serif"/>
+              </a:rPr>
+              <a:t> </a:t>
+            </a:r>
+            <a:r>
+              <a:rPr lang="en-US" sz="3099" dirty="0" err="1">
+                <a:solidFill>
+                  <a:srgbClr val="000000"/>
+                </a:solidFill>
+                <a:latin typeface="DejaVu Serif"/>
+              </a:rPr>
+              <a:t>nhận</a:t>
+            </a:r>
+            <a:r>
+              <a:rPr lang="en-US" sz="3099" dirty="0">
+                <a:solidFill>
+                  <a:srgbClr val="000000"/>
+                </a:solidFill>
+                <a:latin typeface="DejaVu Serif"/>
+              </a:rPr>
+              <a:t> 2 </a:t>
+            </a:r>
+            <a:r>
+              <a:rPr lang="en-US" sz="3099" dirty="0" err="1">
+                <a:solidFill>
+                  <a:srgbClr val="000000"/>
+                </a:solidFill>
+                <a:latin typeface="DejaVu Serif"/>
+              </a:rPr>
+              <a:t>mặt</a:t>
+            </a:r>
+            <a:r>
+              <a:rPr lang="en-US" sz="3099" dirty="0">
+                <a:solidFill>
+                  <a:srgbClr val="000000"/>
+                </a:solidFill>
+                <a:latin typeface="DejaVu Serif"/>
+              </a:rPr>
+              <a:t>) </a:t>
             </a:r>
           </a:p>
         </p:txBody>
@@ -9352,13 +9496,130 @@
               </a:lnSpc>
             </a:pPr>
             <a:r>
+              <a:rPr lang="en-US" sz="3099" dirty="0" err="1">
+                <a:solidFill>
+                  <a:srgbClr val="000000"/>
+                </a:solidFill>
+                <a:latin typeface="DejaVu Serif"/>
+              </a:rPr>
+              <a:t>Chứng</a:t>
+            </a:r>
+            <a:r>
+              <a:rPr lang="en-US" sz="3099" dirty="0">
+                <a:solidFill>
+                  <a:srgbClr val="000000"/>
+                </a:solidFill>
+                <a:latin typeface="DejaVu Serif"/>
+              </a:rPr>
+              <a:t> </a:t>
+            </a:r>
+            <a:r>
+              <a:rPr lang="en-US" sz="3099" dirty="0" err="1">
+                <a:solidFill>
+                  <a:srgbClr val="000000"/>
+                </a:solidFill>
+                <a:latin typeface="DejaVu Serif"/>
+              </a:rPr>
+              <a:t>chỉ</a:t>
+            </a:r>
+            <a:r>
+              <a:rPr lang="en-US" sz="3099" dirty="0">
+                <a:solidFill>
+                  <a:srgbClr val="000000"/>
+                </a:solidFill>
+                <a:latin typeface="DejaVu Serif"/>
+              </a:rPr>
+              <a:t> </a:t>
+            </a:r>
+            <a:r>
+              <a:rPr lang="en-US" sz="3099" dirty="0" err="1">
+                <a:solidFill>
+                  <a:srgbClr val="000000"/>
+                </a:solidFill>
+                <a:latin typeface="DejaVu Serif"/>
+              </a:rPr>
+              <a:t>hành</a:t>
+            </a:r>
+            <a:r>
+              <a:rPr lang="en-US" sz="3099" dirty="0">
+                <a:solidFill>
+                  <a:srgbClr val="000000"/>
+                </a:solidFill>
+                <a:latin typeface="DejaVu Serif"/>
+              </a:rPr>
+              <a:t> </a:t>
+            </a:r>
+            <a:r>
+              <a:rPr lang="en-US" sz="3099" dirty="0" err="1">
+                <a:solidFill>
+                  <a:srgbClr val="000000"/>
+                </a:solidFill>
+                <a:latin typeface="DejaVu Serif"/>
+              </a:rPr>
+              <a:t>nghề</a:t>
+            </a:r>
+            <a:r>
+              <a:rPr lang="en-US" sz="3099" dirty="0">
+                <a:solidFill>
+                  <a:srgbClr val="000000"/>
+                </a:solidFill>
+                <a:latin typeface="DejaVu Serif"/>
+              </a:rPr>
+              <a:t> (</a:t>
+            </a:r>
+            <a:r>
+              <a:rPr lang="en-US" sz="3099" dirty="0" err="1">
+                <a:solidFill>
+                  <a:srgbClr val="000000"/>
+                </a:solidFill>
+                <a:latin typeface="DejaVu Serif"/>
+              </a:rPr>
+              <a:t>Chụp</a:t>
+            </a:r>
+            <a:r>
+              <a:rPr lang="en-US" sz="3099" dirty="0">
+                <a:solidFill>
+                  <a:srgbClr val="000000"/>
+                </a:solidFill>
+                <a:latin typeface="DejaVu Serif"/>
+              </a:rPr>
+              <a:t> </a:t>
+            </a:r>
+            <a:r>
+              <a:rPr lang="en-US" sz="3099" dirty="0" err="1">
+                <a:solidFill>
+                  <a:srgbClr val="000000"/>
+                </a:solidFill>
+                <a:latin typeface="DejaVu Serif"/>
+              </a:rPr>
+              <a:t>hai</a:t>
+            </a:r>
+            <a:r>
+              <a:rPr lang="en-US" sz="3099" dirty="0">
+                <a:solidFill>
+                  <a:srgbClr val="000000"/>
+                </a:solidFill>
+                <a:latin typeface="DejaVu Serif"/>
+              </a:rPr>
+              <a:t> </a:t>
+            </a:r>
+            <a:r>
+              <a:rPr lang="en-US" sz="3099" dirty="0" err="1">
+                <a:solidFill>
+                  <a:srgbClr val="000000"/>
+                </a:solidFill>
+                <a:latin typeface="DejaVu Serif"/>
+              </a:rPr>
+              <a:t>mặt</a:t>
+            </a:r>
+            <a:r>
               <a:rPr lang="en-US" sz="3099">
                 <a:solidFill>
                   <a:srgbClr val="000000"/>
                 </a:solidFill>
                 <a:latin typeface="DejaVu Serif"/>
               </a:rPr>
-              <a:t>Chứng chỉ hành nghề (Chụp hai mặt ):</a:t>
+              <a:t> ):</a:t>
             </a:r>
           </a:p>
         </p:txBody>

</xml_diff>